<commit_message>
modified:   doc/img/buy_ski_blade.png modified:   doc/img/figures.pptx
</commit_message>
<xml_diff>
--- a/doc/img/figures.pptx
+++ b/doc/img/figures.pptx
@@ -288,7 +288,7 @@
           <a:p>
             <a:fld id="{59B1E9C4-7561-364C-9BE6-CF0F98FF92EA}" type="datetimeFigureOut">
               <a:rPr lang="en-US" smtClean="0"/>
-              <a:t>2014/02/16</a:t>
+              <a:t>2/17/2014</a:t>
             </a:fld>
             <a:endParaRPr lang="en-US"/>
           </a:p>
@@ -458,7 +458,7 @@
           <a:p>
             <a:fld id="{59B1E9C4-7561-364C-9BE6-CF0F98FF92EA}" type="datetimeFigureOut">
               <a:rPr lang="en-US" smtClean="0"/>
-              <a:t>2014/02/16</a:t>
+              <a:t>2/17/2014</a:t>
             </a:fld>
             <a:endParaRPr lang="en-US"/>
           </a:p>
@@ -638,7 +638,7 @@
           <a:p>
             <a:fld id="{59B1E9C4-7561-364C-9BE6-CF0F98FF92EA}" type="datetimeFigureOut">
               <a:rPr lang="en-US" smtClean="0"/>
-              <a:t>2014/02/16</a:t>
+              <a:t>2/17/2014</a:t>
             </a:fld>
             <a:endParaRPr lang="en-US"/>
           </a:p>
@@ -808,7 +808,7 @@
           <a:p>
             <a:fld id="{59B1E9C4-7561-364C-9BE6-CF0F98FF92EA}" type="datetimeFigureOut">
               <a:rPr lang="en-US" smtClean="0"/>
-              <a:t>2014/02/16</a:t>
+              <a:t>2/17/2014</a:t>
             </a:fld>
             <a:endParaRPr lang="en-US"/>
           </a:p>
@@ -1054,7 +1054,7 @@
           <a:p>
             <a:fld id="{59B1E9C4-7561-364C-9BE6-CF0F98FF92EA}" type="datetimeFigureOut">
               <a:rPr lang="en-US" smtClean="0"/>
-              <a:t>2014/02/16</a:t>
+              <a:t>2/17/2014</a:t>
             </a:fld>
             <a:endParaRPr lang="en-US"/>
           </a:p>
@@ -1342,7 +1342,7 @@
           <a:p>
             <a:fld id="{59B1E9C4-7561-364C-9BE6-CF0F98FF92EA}" type="datetimeFigureOut">
               <a:rPr lang="en-US" smtClean="0"/>
-              <a:t>2014/02/16</a:t>
+              <a:t>2/17/2014</a:t>
             </a:fld>
             <a:endParaRPr lang="en-US"/>
           </a:p>
@@ -1764,7 +1764,7 @@
           <a:p>
             <a:fld id="{59B1E9C4-7561-364C-9BE6-CF0F98FF92EA}" type="datetimeFigureOut">
               <a:rPr lang="en-US" smtClean="0"/>
-              <a:t>2014/02/16</a:t>
+              <a:t>2/17/2014</a:t>
             </a:fld>
             <a:endParaRPr lang="en-US"/>
           </a:p>
@@ -1882,7 +1882,7 @@
           <a:p>
             <a:fld id="{59B1E9C4-7561-364C-9BE6-CF0F98FF92EA}" type="datetimeFigureOut">
               <a:rPr lang="en-US" smtClean="0"/>
-              <a:t>2014/02/16</a:t>
+              <a:t>2/17/2014</a:t>
             </a:fld>
             <a:endParaRPr lang="en-US"/>
           </a:p>
@@ -1977,7 +1977,7 @@
           <a:p>
             <a:fld id="{59B1E9C4-7561-364C-9BE6-CF0F98FF92EA}" type="datetimeFigureOut">
               <a:rPr lang="en-US" smtClean="0"/>
-              <a:t>2014/02/16</a:t>
+              <a:t>2/17/2014</a:t>
             </a:fld>
             <a:endParaRPr lang="en-US"/>
           </a:p>
@@ -2254,7 +2254,7 @@
           <a:p>
             <a:fld id="{59B1E9C4-7561-364C-9BE6-CF0F98FF92EA}" type="datetimeFigureOut">
               <a:rPr lang="en-US" smtClean="0"/>
-              <a:t>2014/02/16</a:t>
+              <a:t>2/17/2014</a:t>
             </a:fld>
             <a:endParaRPr lang="en-US"/>
           </a:p>
@@ -2507,7 +2507,7 @@
           <a:p>
             <a:fld id="{59B1E9C4-7561-364C-9BE6-CF0F98FF92EA}" type="datetimeFigureOut">
               <a:rPr lang="en-US" smtClean="0"/>
-              <a:t>2014/02/16</a:t>
+              <a:t>2/17/2014</a:t>
             </a:fld>
             <a:endParaRPr lang="en-US"/>
           </a:p>
@@ -2720,7 +2720,7 @@
           <a:p>
             <a:fld id="{59B1E9C4-7561-364C-9BE6-CF0F98FF92EA}" type="datetimeFigureOut">
               <a:rPr lang="en-US" smtClean="0"/>
-              <a:t>2014/02/16</a:t>
+              <a:t>2/17/2014</a:t>
             </a:fld>
             <a:endParaRPr lang="en-US"/>
           </a:p>
@@ -3103,7 +3103,7 @@
         </p:nvSpPr>
         <p:spPr>
           <a:xfrm>
-            <a:off x="4669925" y="1879600"/>
+            <a:off x="3536450" y="2036471"/>
             <a:ext cx="1973077" cy="942783"/>
           </a:xfrm>
           <a:prstGeom prst="rect">
@@ -3150,8 +3150,8 @@
         </p:nvCxnSpPr>
         <p:spPr>
           <a:xfrm>
-            <a:off x="2704688" y="2822383"/>
-            <a:ext cx="4445095" cy="0"/>
+            <a:off x="1571213" y="2979254"/>
+            <a:ext cx="5172487" cy="0"/>
           </a:xfrm>
           <a:prstGeom prst="line">
             <a:avLst/>
@@ -3189,7 +3189,7 @@
         </p:nvSpPr>
         <p:spPr>
           <a:xfrm>
-            <a:off x="4495638" y="2836761"/>
+            <a:off x="3362163" y="2993632"/>
             <a:ext cx="348573" cy="338554"/>
           </a:xfrm>
           <a:prstGeom prst="rect">
@@ -3225,7 +3225,7 @@
         </p:nvSpPr>
         <p:spPr>
           <a:xfrm>
-            <a:off x="2546017" y="2842357"/>
+            <a:off x="1412542" y="2999228"/>
             <a:ext cx="288661" cy="338554"/>
           </a:xfrm>
           <a:prstGeom prst="rect">
@@ -3261,7 +3261,7 @@
         </p:nvSpPr>
         <p:spPr>
           <a:xfrm>
-            <a:off x="6295671" y="2848268"/>
+            <a:off x="5162196" y="3005139"/>
             <a:ext cx="750726" cy="338554"/>
           </a:xfrm>
           <a:prstGeom prst="rect">
@@ -3297,7 +3297,7 @@
         </p:nvSpPr>
         <p:spPr>
           <a:xfrm>
-            <a:off x="4514702" y="1083283"/>
+            <a:off x="3381227" y="944879"/>
             <a:ext cx="2377574" cy="307777"/>
           </a:xfrm>
           <a:prstGeom prst="rect">
@@ -3364,7 +3364,7 @@
         </p:nvGrpSpPr>
         <p:grpSpPr>
           <a:xfrm>
-            <a:off x="2696847" y="2759075"/>
+            <a:off x="1563372" y="2915946"/>
             <a:ext cx="4165386" cy="127000"/>
             <a:chOff x="2696848" y="2540144"/>
             <a:chExt cx="2895600" cy="282239"/>
@@ -4140,7 +4140,7 @@
         </p:nvSpPr>
         <p:spPr>
           <a:xfrm>
-            <a:off x="4735853" y="1902160"/>
+            <a:off x="3602378" y="2059031"/>
             <a:ext cx="1859335" cy="523220"/>
           </a:xfrm>
           <a:prstGeom prst="rect">
@@ -4202,8 +4202,8 @@
         </p:nvCxnSpPr>
         <p:spPr>
           <a:xfrm>
-            <a:off x="6643002" y="1391060"/>
-            <a:ext cx="0" cy="488540"/>
+            <a:off x="5509527" y="1252656"/>
+            <a:ext cx="0" cy="783815"/>
           </a:xfrm>
           <a:prstGeom prst="straightConnector1">
             <a:avLst/>
@@ -4231,6 +4231,97 @@
           </a:fontRef>
         </p:style>
       </p:cxnSp>
+      <p:cxnSp>
+        <p:nvCxnSpPr>
+          <p:cNvPr id="32" name="Straight Arrow Connector 3"/>
+          <p:cNvCxnSpPr/>
+          <p:nvPr/>
+        </p:nvCxnSpPr>
+        <p:spPr>
+          <a:xfrm>
+            <a:off x="5728758" y="2427406"/>
+            <a:ext cx="0" cy="488540"/>
+          </a:xfrm>
+          <a:prstGeom prst="straightConnector1">
+            <a:avLst/>
+          </a:prstGeom>
+          <a:ln>
+            <a:solidFill>
+              <a:srgbClr val="7F7F7F"/>
+            </a:solidFill>
+            <a:prstDash val="solid"/>
+            <a:tailEnd type="arrow"/>
+          </a:ln>
+        </p:spPr>
+        <p:style>
+          <a:lnRef idx="2">
+            <a:schemeClr val="accent1"/>
+          </a:lnRef>
+          <a:fillRef idx="0">
+            <a:schemeClr val="accent1"/>
+          </a:fillRef>
+          <a:effectRef idx="1">
+            <a:schemeClr val="accent1"/>
+          </a:effectRef>
+          <a:fontRef idx="minor">
+            <a:schemeClr val="tx1"/>
+          </a:fontRef>
+        </p:style>
+      </p:cxnSp>
+      <p:sp>
+        <p:nvSpPr>
+          <p:cNvPr id="33" name="TextBox 34"/>
+          <p:cNvSpPr txBox="1"/>
+          <p:nvPr/>
+        </p:nvSpPr>
+        <p:spPr>
+          <a:xfrm>
+            <a:off x="5588794" y="1547931"/>
+            <a:ext cx="2511598" cy="954107"/>
+          </a:xfrm>
+          <a:prstGeom prst="rect">
+            <a:avLst/>
+          </a:prstGeom>
+          <a:noFill/>
+        </p:spPr>
+        <p:txBody>
+          <a:bodyPr wrap="square" rtlCol="0">
+            <a:spAutoFit/>
+          </a:bodyPr>
+          <a:lstStyle/>
+          <a:p>
+            <a:r>
+              <a:rPr lang="ja-JP" altLang="en-US" sz="1400" dirty="0" smtClean="0">
+                <a:latin typeface="Calibri"/>
+                <a:ea typeface="Meiryo"/>
+                <a:cs typeface="Calibri"/>
+              </a:rPr>
+              <a:t>旧方式</a:t>
+            </a:r>
+            <a:r>
+              <a:rPr lang="ja-JP" altLang="en-US" sz="1400" dirty="0">
+                <a:latin typeface="Calibri"/>
+                <a:ea typeface="Meiryo"/>
+                <a:cs typeface="Calibri"/>
+              </a:rPr>
+              <a:t>で</a:t>
+            </a:r>
+            <a:r>
+              <a:rPr lang="ja-JP" altLang="en-US" sz="1400" dirty="0" smtClean="0">
+                <a:latin typeface="Calibri"/>
+                <a:ea typeface="Meiryo"/>
+                <a:cs typeface="Calibri"/>
+              </a:rPr>
+              <a:t>はここでスキーを止めると最悪だった。新方式は買った直後にスキーを止める事態の確率を減らす方向</a:t>
+            </a:r>
+            <a:endParaRPr lang="en-US" sz="1400" dirty="0">
+              <a:latin typeface="Calibri"/>
+              <a:ea typeface="Meiryo"/>
+              <a:cs typeface="Calibri"/>
+            </a:endParaRPr>
+          </a:p>
+        </p:txBody>
+      </p:sp>
     </p:spTree>
     <p:extLst>
       <p:ext uri="{BB962C8B-B14F-4D97-AF65-F5344CB8AC3E}">

</xml_diff>